<commit_message>
updated doc/ with UML diagram (This is the final version of the project
</commit_message>
<xml_diff>
--- a/doc/smart_rail_design.pptx
+++ b/doc/smart_rail_design.pptx
@@ -216,7 +216,7 @@
             <a:fld id="{2447E72A-D913-4DC2-9E0A-E520CE8FCC86}" type="datetimeFigureOut">
               <a:rPr lang="en-US" smtClean="0"/>
               <a:pPr/>
-              <a:t>10/19/2017</a:t>
+              <a:t>11/16/2017</a:t>
             </a:fld>
             <a:endParaRPr lang="en-US"/>
           </a:p>
@@ -1102,7 +1102,7 @@
             <a:fld id="{743653DA-8BF4-4869-96FE-9BCF43372D46}" type="datetime8">
               <a:rPr lang="en-US" smtClean="0"/>
               <a:pPr algn="ctr"/>
-              <a:t>10/19/2017 12:24 PM</a:t>
+              <a:t>11/16/2017 7:38 PM</a:t>
             </a:fld>
             <a:endParaRPr lang="en-US" sz="2000" dirty="0">
               <a:solidFill>
@@ -1310,7 +1310,7 @@
                 </a:solidFill>
               </a:rPr>
               <a:pPr/>
-              <a:t>10/19/2017 12:24 PM</a:t>
+              <a:t>11/16/2017 7:38 PM</a:t>
             </a:fld>
             <a:endParaRPr lang="en-US"/>
           </a:p>
@@ -1505,7 +1505,7 @@
                 </a:solidFill>
               </a:rPr>
               <a:pPr/>
-              <a:t>10/19/2017 12:24 PM</a:t>
+              <a:t>11/16/2017 7:38 PM</a:t>
             </a:fld>
             <a:endParaRPr lang="en-US" dirty="0"/>
           </a:p>
@@ -1774,7 +1774,7 @@
             <a:fld id="{B7129108-AC8D-4212-9283-60D9E99BF07A}" type="datetime8">
               <a:rPr lang="en-US" smtClean="0"/>
               <a:pPr/>
-              <a:t>10/19/2017 12:24 PM</a:t>
+              <a:t>11/16/2017 7:38 PM</a:t>
             </a:fld>
             <a:endParaRPr lang="en-US" dirty="0"/>
           </a:p>
@@ -2196,7 +2196,7 @@
             <a:fld id="{B6DED3D3-6235-4F4C-B439-DF277FB555A7}" type="datetime8">
               <a:rPr lang="en-US" smtClean="0"/>
               <a:pPr/>
-              <a:t>10/19/2017 12:24 PM</a:t>
+              <a:t>11/16/2017 7:38 PM</a:t>
             </a:fld>
             <a:endParaRPr lang="en-US"/>
           </a:p>
@@ -2444,7 +2444,7 @@
             <a:fld id="{3B5F1E3E-4B2F-4895-B65E-28B2E64F39F6}" type="datetime8">
               <a:rPr lang="en-US" smtClean="0"/>
               <a:pPr/>
-              <a:t>10/19/2017 12:24 PM</a:t>
+              <a:t>11/16/2017 7:38 PM</a:t>
             </a:fld>
             <a:endParaRPr lang="en-US"/>
           </a:p>
@@ -2683,7 +2683,7 @@
             <a:fld id="{63085435-8225-4333-BFFA-0096413F0D76}" type="datetime8">
               <a:rPr lang="en-US" smtClean="0"/>
               <a:pPr/>
-              <a:t>10/19/2017 12:24 PM</a:t>
+              <a:t>11/16/2017 7:38 PM</a:t>
             </a:fld>
             <a:endParaRPr lang="en-US"/>
           </a:p>
@@ -2880,7 +2880,7 @@
             <a:fld id="{0783C494-2A87-468C-A21B-CB14FB9ABB00}" type="datetime8">
               <a:rPr lang="en-US" smtClean="0"/>
               <a:pPr/>
-              <a:t>10/19/2017 12:24 PM</a:t>
+              <a:t>11/16/2017 7:38 PM</a:t>
             </a:fld>
             <a:endParaRPr lang="en-US"/>
           </a:p>
@@ -2984,7 +2984,7 @@
             <a:fld id="{9A180FA0-5B31-4864-A2BB-719EA5A679C6}" type="datetime8">
               <a:rPr lang="en-US" smtClean="0"/>
               <a:pPr/>
-              <a:t>10/19/2017 12:24 PM</a:t>
+              <a:t>11/16/2017 7:38 PM</a:t>
             </a:fld>
             <a:endParaRPr lang="en-US"/>
           </a:p>
@@ -3126,7 +3126,7 @@
             <a:fld id="{4BECC0C8-36B8-442A-833D-B6AACE86BB77}" type="datetime8">
               <a:rPr lang="en-US" smtClean="0"/>
               <a:pPr/>
-              <a:t>10/19/2017 12:24 PM</a:t>
+              <a:t>11/16/2017 7:38 PM</a:t>
             </a:fld>
             <a:endParaRPr lang="en-US"/>
           </a:p>
@@ -3650,7 +3650,7 @@
             <a:fld id="{51E20EC5-AC53-4169-941E-EDF10CD23748}" type="datetime8">
               <a:rPr lang="en-US" smtClean="0"/>
               <a:pPr/>
-              <a:t>10/19/2017 12:24 PM</a:t>
+              <a:t>11/16/2017 7:38 PM</a:t>
             </a:fld>
             <a:endParaRPr lang="en-US"/>
           </a:p>
@@ -3918,7 +3918,7 @@
                 </a:solidFill>
               </a:rPr>
               <a:pPr/>
-              <a:t>10/19/2017 12:24 PM</a:t>
+              <a:t>11/16/2017 7:38 PM</a:t>
             </a:fld>
             <a:endParaRPr lang="en-US" sz="1400" dirty="0">
               <a:solidFill>
@@ -4527,8 +4527,13 @@
           <a:p>
             <a:r>
               <a:rPr lang="en-US" dirty="0"/>
-              <a:t>Akash Patel</a:t>
-            </a:r>
+              <a:t>Akash Patel and Gabriel </a:t>
+            </a:r>
+            <a:r>
+              <a:rPr lang="en-US" dirty="0" err="1"/>
+              <a:t>Urbaitis</a:t>
+            </a:r>
+            <a:endParaRPr lang="en-US" dirty="0"/>
           </a:p>
           <a:p>
             <a:r>
@@ -4609,7 +4614,15 @@
           <a:p>
             <a:r>
               <a:rPr lang="en-US" dirty="0"/>
-              <a:t>Show the UML diagram for the entire domino project</a:t>
+              <a:t>Show the UML diagram for the entire </a:t>
+            </a:r>
+            <a:r>
+              <a:rPr lang="en-US" dirty="0" err="1"/>
+              <a:t>SmartRail</a:t>
+            </a:r>
+            <a:r>
+              <a:rPr lang="en-US" dirty="0"/>
+              <a:t> Project</a:t>
             </a:r>
           </a:p>
           <a:p>
@@ -4848,10 +4861,10 @@
       </p:sp>
       <p:pic>
         <p:nvPicPr>
-          <p:cNvPr id="7" name="Content Placeholder 6">
+          <p:cNvPr id="6" name="Content Placeholder 5">
             <a:extLst>
               <a:ext uri="{FF2B5EF4-FFF2-40B4-BE49-F238E27FC236}">
-                <a16:creationId xmlns:a16="http://schemas.microsoft.com/office/drawing/2014/main" id="{13839ED9-9766-4356-A958-29CAB9BCE281}"/>
+                <a16:creationId xmlns:a16="http://schemas.microsoft.com/office/drawing/2014/main" id="{76DDD6A6-8632-4758-9929-913D6FCBDEC4}"/>
               </a:ext>
             </a:extLst>
           </p:cNvPr>
@@ -4876,8 +4889,8 @@
         </p:blipFill>
         <p:spPr>
           <a:xfrm>
-            <a:off x="3716399" y="1295400"/>
-            <a:ext cx="5213094" cy="4495800"/>
+            <a:off x="4142574" y="-5563"/>
+            <a:ext cx="4544226" cy="6833031"/>
           </a:xfrm>
         </p:spPr>
       </p:pic>
@@ -4946,13 +4959,17 @@
         <p:spPr/>
         <p:txBody>
           <a:bodyPr>
-            <a:normAutofit fontScale="85000" lnSpcReduction="20000"/>
+            <a:normAutofit fontScale="77500" lnSpcReduction="20000"/>
           </a:bodyPr>
           <a:lstStyle/>
           <a:p>
             <a:r>
+              <a:rPr lang="en-US" dirty="0" err="1"/>
+              <a:t>SmartRail</a:t>
+            </a:r>
+            <a:r>
               <a:rPr lang="en-US" dirty="0"/>
-              <a:t>Boggle is the entry point</a:t>
+              <a:t> Class is the entry point</a:t>
             </a:r>
           </a:p>
           <a:p>
@@ -4965,25 +4982,39 @@
           <a:p>
             <a:r>
               <a:rPr lang="en-US" dirty="0"/>
-              <a:t>The Main Menu class launches the Handler when someone hits play and chooses a tray size. </a:t>
+              <a:t>The Main Menu creates the Coordinator which in turn instantiates all the objects, starts all the threads, and initializes the Display class. </a:t>
             </a:r>
           </a:p>
           <a:p>
             <a:r>
               <a:rPr lang="en-US" dirty="0"/>
-              <a:t>The Handler creates the tray, loads the dictionary and solves the tray, storing the solutions in a list. The Handler also initializes the GUI.</a:t>
+              <a:t>The Coordinator reads the file and creates the appropriate objects with respect to the configuration that is read.</a:t>
             </a:r>
           </a:p>
           <a:p>
             <a:r>
               <a:rPr lang="en-US" dirty="0"/>
-              <a:t>The game display class creates all the game assets and updates and loads them when needed. It also includes a pause button that is used to return to the menu.</a:t>
+              <a:t>The Display class creates all GUI elements and updates the state/location of the train and the lights via the use of an Animation Timer rendering at 60 Hz.</a:t>
             </a:r>
           </a:p>
           <a:p>
             <a:r>
               <a:rPr lang="en-US" dirty="0"/>
-              <a:t>Once the three minute timer runs out the game exits to the game over screen and the results are viewable there. The game can be restarted by going back to the main menu.</a:t>
+              <a:t>The Main Menu allows the user to choose one of 4 config files, config3 and </a:t>
+            </a:r>
+            <a:r>
+              <a:rPr lang="en-US" dirty="0" err="1"/>
+              <a:t>config_TA</a:t>
+            </a:r>
+            <a:r>
+              <a:rPr lang="en-US" dirty="0"/>
+              <a:t> are left for the TAs to change as they please. Further instructions can be found in the read me.</a:t>
+            </a:r>
+          </a:p>
+          <a:p>
+            <a:r>
+              <a:rPr lang="en-US" b="1" i="1" dirty="0"/>
+              <a:t>Lastly, the diagram in the previous slide shows the relationship between all the classes and all their PUBLIC methods.</a:t>
             </a:r>
           </a:p>
         </p:txBody>

</xml_diff>